<commit_message>
PPT - revisi 1
</commit_message>
<xml_diff>
--- a/Presentasi Tugas Akhir.pptx
+++ b/Presentasi Tugas Akhir.pptx
@@ -265,7 +265,7 @@
           <a:p>
             <a:fld id="{10A0DBFA-39DF-4FFB-AEC1-84A9754004F4}" type="datetimeFigureOut">
               <a:rPr lang="en-US" smtClean="0"/>
-              <a:t>12/4/2018</a:t>
+              <a:t>12/5/2018</a:t>
             </a:fld>
             <a:endParaRPr lang="en-US"/>
           </a:p>
@@ -624,7 +624,7 @@
           <a:p>
             <a:fld id="{10A0DBFA-39DF-4FFB-AEC1-84A9754004F4}" type="datetimeFigureOut">
               <a:rPr lang="en-US" smtClean="0"/>
-              <a:t>12/4/2018</a:t>
+              <a:t>12/5/2018</a:t>
             </a:fld>
             <a:endParaRPr lang="en-US"/>
           </a:p>
@@ -799,7 +799,7 @@
           <a:p>
             <a:fld id="{10A0DBFA-39DF-4FFB-AEC1-84A9754004F4}" type="datetimeFigureOut">
               <a:rPr lang="en-US" smtClean="0"/>
-              <a:t>12/4/2018</a:t>
+              <a:t>12/5/2018</a:t>
             </a:fld>
             <a:endParaRPr lang="en-US"/>
           </a:p>
@@ -1034,7 +1034,7 @@
           <a:p>
             <a:fld id="{10A0DBFA-39DF-4FFB-AEC1-84A9754004F4}" type="datetimeFigureOut">
               <a:rPr lang="en-US" smtClean="0"/>
-              <a:t>12/4/2018</a:t>
+              <a:t>12/5/2018</a:t>
             </a:fld>
             <a:endParaRPr lang="en-US"/>
           </a:p>
@@ -1303,7 +1303,7 @@
           <a:p>
             <a:fld id="{10A0DBFA-39DF-4FFB-AEC1-84A9754004F4}" type="datetimeFigureOut">
               <a:rPr lang="en-US" smtClean="0"/>
-              <a:t>12/4/2018</a:t>
+              <a:t>12/5/2018</a:t>
             </a:fld>
             <a:endParaRPr lang="en-US"/>
           </a:p>
@@ -1523,7 +1523,7 @@
           <a:p>
             <a:fld id="{10A0DBFA-39DF-4FFB-AEC1-84A9754004F4}" type="datetimeFigureOut">
               <a:rPr lang="en-US" smtClean="0"/>
-              <a:t>12/4/2018</a:t>
+              <a:t>12/5/2018</a:t>
             </a:fld>
             <a:endParaRPr lang="en-US"/>
           </a:p>
@@ -1875,7 +1875,7 @@
           <a:p>
             <a:fld id="{10A0DBFA-39DF-4FFB-AEC1-84A9754004F4}" type="datetimeFigureOut">
               <a:rPr lang="en-US" smtClean="0"/>
-              <a:t>12/4/2018</a:t>
+              <a:t>12/5/2018</a:t>
             </a:fld>
             <a:endParaRPr lang="en-US"/>
           </a:p>
@@ -2107,7 +2107,7 @@
           <a:p>
             <a:fld id="{10A0DBFA-39DF-4FFB-AEC1-84A9754004F4}" type="datetimeFigureOut">
               <a:rPr lang="en-US" smtClean="0"/>
-              <a:t>12/4/2018</a:t>
+              <a:t>12/5/2018</a:t>
             </a:fld>
             <a:endParaRPr lang="en-US"/>
           </a:p>
@@ -2247,7 +2247,7 @@
           <a:p>
             <a:fld id="{10A0DBFA-39DF-4FFB-AEC1-84A9754004F4}" type="datetimeFigureOut">
               <a:rPr lang="en-US" smtClean="0"/>
-              <a:t>12/4/2018</a:t>
+              <a:t>12/5/2018</a:t>
             </a:fld>
             <a:endParaRPr lang="en-US"/>
           </a:p>
@@ -2524,7 +2524,7 @@
           <a:p>
             <a:fld id="{10A0DBFA-39DF-4FFB-AEC1-84A9754004F4}" type="datetimeFigureOut">
               <a:rPr lang="en-US" smtClean="0"/>
-              <a:t>12/4/2018</a:t>
+              <a:t>12/5/2018</a:t>
             </a:fld>
             <a:endParaRPr lang="en-US"/>
           </a:p>
@@ -2931,7 +2931,7 @@
           <a:p>
             <a:fld id="{10A0DBFA-39DF-4FFB-AEC1-84A9754004F4}" type="datetimeFigureOut">
               <a:rPr lang="en-US" smtClean="0"/>
-              <a:t>12/4/2018</a:t>
+              <a:t>12/5/2018</a:t>
             </a:fld>
             <a:endParaRPr lang="en-US"/>
           </a:p>
@@ -3269,7 +3269,7 @@
           <a:p>
             <a:fld id="{10A0DBFA-39DF-4FFB-AEC1-84A9754004F4}" type="datetimeFigureOut">
               <a:rPr lang="en-US" smtClean="0"/>
-              <a:t>12/4/2018</a:t>
+              <a:t>12/5/2018</a:t>
             </a:fld>
             <a:endParaRPr lang="en-US"/>
           </a:p>
@@ -3985,21 +3985,8 @@
                   <a:schemeClr val="tx1"/>
                 </a:solidFill>
               </a:rPr>
-              <a:t> (</a:t>
-            </a:r>
-            <a:r>
-              <a:rPr lang="en-US" dirty="0" smtClean="0">
-                <a:solidFill>
-                  <a:schemeClr val="tx1"/>
-                </a:solidFill>
-              </a:rPr>
-              <a:t>1631710117)</a:t>
-            </a:r>
-            <a:endParaRPr lang="en-US" dirty="0" smtClean="0">
-              <a:solidFill>
-                <a:schemeClr val="tx1"/>
-              </a:solidFill>
-            </a:endParaRPr>
+              <a:t> (1631710117)</a:t>
+            </a:r>
           </a:p>
           <a:p>
             <a:endParaRPr lang="en-US" dirty="0"/>
@@ -4714,7 +4701,11 @@
             </a:pPr>
             <a:r>
               <a:rPr lang="en-US" dirty="0" smtClean="0"/>
-              <a:t>Workflow Management System</a:t>
+              <a:t>Workflow </a:t>
+            </a:r>
+            <a:r>
+              <a:rPr lang="en-US" dirty="0" smtClean="0"/>
+              <a:t>Configuration</a:t>
             </a:r>
             <a:endParaRPr lang="en-US" dirty="0" smtClean="0"/>
           </a:p>

</xml_diff>

<commit_message>
PPT - revisi 3
</commit_message>
<xml_diff>
--- a/Presentasi Tugas Akhir.pptx
+++ b/Presentasi Tugas Akhir.pptx
@@ -4145,6 +4145,13 @@
   <p:clrMapOvr>
     <a:masterClrMapping/>
   </p:clrMapOvr>
+  <p:timing>
+    <p:tnLst>
+      <p:par>
+        <p:cTn id="1" dur="indefinite" restart="never" nodeType="tmRoot"/>
+      </p:par>
+    </p:tnLst>
+  </p:timing>
 </p:sld>
 </file>
 
@@ -4220,7 +4227,7 @@
       </p:sp>
       <p:pic>
         <p:nvPicPr>
-          <p:cNvPr id="2050" name="Picture 2" descr="D:\Kuliah\TA\baru\flowchart.JPG"/>
+          <p:cNvPr id="1026" name="Picture 2" descr="D:\Kuliah\Tugas Akhir\Images\flowchart.JPG"/>
           <p:cNvPicPr>
             <a:picLocks noChangeAspect="1" noChangeArrowheads="1"/>
           </p:cNvPicPr>
@@ -4241,8 +4248,8 @@
         </p:blipFill>
         <p:spPr bwMode="auto">
           <a:xfrm>
-            <a:off x="3581400" y="1248696"/>
-            <a:ext cx="3078446" cy="5380703"/>
+            <a:off x="4419600" y="685800"/>
+            <a:ext cx="3200400" cy="5930153"/>
           </a:xfrm>
           <a:prstGeom prst="rect">
             <a:avLst/>
@@ -4269,6 +4276,13 @@
   <p:clrMapOvr>
     <a:masterClrMapping/>
   </p:clrMapOvr>
+  <p:timing>
+    <p:tnLst>
+      <p:par>
+        <p:cTn id="1" dur="indefinite" restart="never" nodeType="tmRoot"/>
+      </p:par>
+    </p:tnLst>
+  </p:timing>
 </p:sld>
 </file>
 
@@ -4751,6 +4765,13 @@
   <p:clrMapOvr>
     <a:masterClrMapping/>
   </p:clrMapOvr>
+  <p:timing>
+    <p:tnLst>
+      <p:par>
+        <p:cTn id="1" dur="indefinite" restart="never" nodeType="tmRoot"/>
+      </p:par>
+    </p:tnLst>
+  </p:timing>
 </p:sld>
 </file>
 
@@ -4857,6 +4878,13 @@
   <p:clrMapOvr>
     <a:masterClrMapping/>
   </p:clrMapOvr>
+  <p:timing>
+    <p:tnLst>
+      <p:par>
+        <p:cTn id="1" dur="indefinite" restart="never" nodeType="tmRoot"/>
+      </p:par>
+    </p:tnLst>
+  </p:timing>
 </p:sld>
 </file>
 
@@ -5847,11 +5875,11 @@
               <a:t> </a:t>
             </a:r>
             <a:r>
-              <a:rPr lang="en-US" smtClean="0"/>
+              <a:rPr lang="en-US" dirty="0" err="1" smtClean="0"/>
               <a:t>Magang</a:t>
             </a:r>
             <a:r>
-              <a:rPr lang="id-ID" smtClean="0"/>
+              <a:rPr lang="id-ID" dirty="0" smtClean="0"/>
               <a:t> </a:t>
             </a:r>
             <a:r>
@@ -5961,6 +5989,13 @@
   <p:clrMapOvr>
     <a:masterClrMapping/>
   </p:clrMapOvr>
+  <p:timing>
+    <p:tnLst>
+      <p:par>
+        <p:cTn id="1" dur="indefinite" restart="never" nodeType="tmRoot"/>
+      </p:par>
+    </p:tnLst>
+  </p:timing>
 </p:sld>
 </file>
 
@@ -6114,6 +6149,13 @@
   <p:clrMapOvr>
     <a:masterClrMapping/>
   </p:clrMapOvr>
+  <p:timing>
+    <p:tnLst>
+      <p:par>
+        <p:cTn id="1" dur="indefinite" restart="never" nodeType="tmRoot"/>
+      </p:par>
+    </p:tnLst>
+  </p:timing>
 </p:sld>
 </file>
 

</xml_diff>